<commit_message>
Edit lecture 6 notes
</commit_message>
<xml_diff>
--- a/lectures/06-GitHub-Ex.pptx
+++ b/lectures/06-GitHub-Ex.pptx
@@ -132,608 +132,9 @@
     <p1510:client id="{87C8BD35-9779-4BE6-8ED7-EB230113F9D5}" v="101" dt="2022-06-30T18:52:08.389"/>
     <p1510:client id="{A3DAB2D2-DD6E-47D9-9A7E-1C1690C502AC}" v="308" dt="2022-09-06T02:24:31.268"/>
     <p1510:client id="{C27102FF-95FB-4D76-AECA-C3D94152630F}" v="78" dt="2022-06-30T03:30:26.832"/>
+    <p1510:client id="{F8A3E091-3564-455B-AE1A-FE0AF5DDC019}" v="103" dt="2022-09-12T20:57:41.049"/>
   </p1510:revLst>
 </p1510:revInfo>
-</file>
-
-<file path=ppt/changesInfos/changesInfo1.xml><?xml version="1.0" encoding="utf-8"?>
-<pc:chgInfo xmlns:a="http://schemas.openxmlformats.org/drawingml/2006/main" xmlns:r="http://schemas.openxmlformats.org/officeDocument/2006/relationships" xmlns:ac="http://schemas.microsoft.com/office/drawing/2013/main/command" xmlns:pc="http://schemas.microsoft.com/office/powerpoint/2013/main/command">
-  <pc:docChgLst>
-    <pc:chgData name="JD Kilgallin" userId="e8d7d97525d46f8a" providerId="Windows Live" clId="Web-{C27102FF-95FB-4D76-AECA-C3D94152630F}"/>
-    <pc:docChg chg="addSld modSld">
-      <pc:chgData name="JD Kilgallin" userId="e8d7d97525d46f8a" providerId="Windows Live" clId="Web-{C27102FF-95FB-4D76-AECA-C3D94152630F}" dt="2022-06-30T03:30:26.832" v="74" actId="20577"/>
-      <pc:docMkLst>
-        <pc:docMk/>
-      </pc:docMkLst>
-      <pc:sldChg chg="modSp">
-        <pc:chgData name="JD Kilgallin" userId="e8d7d97525d46f8a" providerId="Windows Live" clId="Web-{C27102FF-95FB-4D76-AECA-C3D94152630F}" dt="2022-06-30T03:18:01.720" v="14" actId="20577"/>
-        <pc:sldMkLst>
-          <pc:docMk/>
-          <pc:sldMk cId="109857222" sldId="256"/>
-        </pc:sldMkLst>
-        <pc:spChg chg="mod">
-          <ac:chgData name="JD Kilgallin" userId="e8d7d97525d46f8a" providerId="Windows Live" clId="Web-{C27102FF-95FB-4D76-AECA-C3D94152630F}" dt="2022-06-30T03:15:44.783" v="7" actId="20577"/>
-          <ac:spMkLst>
-            <pc:docMk/>
-            <pc:sldMk cId="109857222" sldId="256"/>
-            <ac:spMk id="2" creationId="{00000000-0000-0000-0000-000000000000}"/>
-          </ac:spMkLst>
-        </pc:spChg>
-        <pc:spChg chg="mod">
-          <ac:chgData name="JD Kilgallin" userId="e8d7d97525d46f8a" providerId="Windows Live" clId="Web-{C27102FF-95FB-4D76-AECA-C3D94152630F}" dt="2022-06-30T03:18:01.720" v="14" actId="20577"/>
-          <ac:spMkLst>
-            <pc:docMk/>
-            <pc:sldMk cId="109857222" sldId="256"/>
-            <ac:spMk id="3" creationId="{00000000-0000-0000-0000-000000000000}"/>
-          </ac:spMkLst>
-        </pc:spChg>
-      </pc:sldChg>
-      <pc:sldChg chg="modSp new">
-        <pc:chgData name="JD Kilgallin" userId="e8d7d97525d46f8a" providerId="Windows Live" clId="Web-{C27102FF-95FB-4D76-AECA-C3D94152630F}" dt="2022-06-30T03:30:26.832" v="74" actId="20577"/>
-        <pc:sldMkLst>
-          <pc:docMk/>
-          <pc:sldMk cId="487134755" sldId="257"/>
-        </pc:sldMkLst>
-        <pc:spChg chg="mod">
-          <ac:chgData name="JD Kilgallin" userId="e8d7d97525d46f8a" providerId="Windows Live" clId="Web-{C27102FF-95FB-4D76-AECA-C3D94152630F}" dt="2022-06-30T03:18:18.610" v="22" actId="20577"/>
-          <ac:spMkLst>
-            <pc:docMk/>
-            <pc:sldMk cId="487134755" sldId="257"/>
-            <ac:spMk id="2" creationId="{439E8C70-60A8-D47C-551B-E491A741019F}"/>
-          </ac:spMkLst>
-        </pc:spChg>
-        <pc:spChg chg="mod">
-          <ac:chgData name="JD Kilgallin" userId="e8d7d97525d46f8a" providerId="Windows Live" clId="Web-{C27102FF-95FB-4D76-AECA-C3D94152630F}" dt="2022-06-30T03:30:26.832" v="74" actId="20577"/>
-          <ac:spMkLst>
-            <pc:docMk/>
-            <pc:sldMk cId="487134755" sldId="257"/>
-            <ac:spMk id="3" creationId="{3E04FA28-0E79-237F-7F30-D982F4258E26}"/>
-          </ac:spMkLst>
-        </pc:spChg>
-      </pc:sldChg>
-    </pc:docChg>
-  </pc:docChgLst>
-  <pc:docChgLst>
-    <pc:chgData name="JD Kilgallin" userId="e8d7d97525d46f8a" providerId="Windows Live" clId="Web-{0ED70861-6065-4019-8764-BF8B1DB834D2}"/>
-    <pc:docChg chg="addSld delSld modSld">
-      <pc:chgData name="JD Kilgallin" userId="e8d7d97525d46f8a" providerId="Windows Live" clId="Web-{0ED70861-6065-4019-8764-BF8B1DB834D2}" dt="2022-09-12T20:43:00.448" v="389" actId="20577"/>
-      <pc:docMkLst>
-        <pc:docMk/>
-      </pc:docMkLst>
-      <pc:sldChg chg="modSp">
-        <pc:chgData name="JD Kilgallin" userId="e8d7d97525d46f8a" providerId="Windows Live" clId="Web-{0ED70861-6065-4019-8764-BF8B1DB834D2}" dt="2022-09-12T16:50:36.839" v="4" actId="20577"/>
-        <pc:sldMkLst>
-          <pc:docMk/>
-          <pc:sldMk cId="2647245224" sldId="262"/>
-        </pc:sldMkLst>
-        <pc:spChg chg="mod">
-          <ac:chgData name="JD Kilgallin" userId="e8d7d97525d46f8a" providerId="Windows Live" clId="Web-{0ED70861-6065-4019-8764-BF8B1DB834D2}" dt="2022-09-12T16:50:36.839" v="4" actId="20577"/>
-          <ac:spMkLst>
-            <pc:docMk/>
-            <pc:sldMk cId="2647245224" sldId="262"/>
-            <ac:spMk id="3" creationId="{0AC3777A-15CC-4B3B-0C92-7F63DFEA7A4F}"/>
-          </ac:spMkLst>
-        </pc:spChg>
-      </pc:sldChg>
-      <pc:sldChg chg="modSp">
-        <pc:chgData name="JD Kilgallin" userId="e8d7d97525d46f8a" providerId="Windows Live" clId="Web-{0ED70861-6065-4019-8764-BF8B1DB834D2}" dt="2022-09-12T16:58:03.465" v="12" actId="20577"/>
-        <pc:sldMkLst>
-          <pc:docMk/>
-          <pc:sldMk cId="1928605281" sldId="263"/>
-        </pc:sldMkLst>
-        <pc:spChg chg="mod">
-          <ac:chgData name="JD Kilgallin" userId="e8d7d97525d46f8a" providerId="Windows Live" clId="Web-{0ED70861-6065-4019-8764-BF8B1DB834D2}" dt="2022-09-12T16:58:03.465" v="12" actId="20577"/>
-          <ac:spMkLst>
-            <pc:docMk/>
-            <pc:sldMk cId="1928605281" sldId="263"/>
-            <ac:spMk id="3" creationId="{6BB8F018-0625-81F3-2679-E28BF1ECCA4B}"/>
-          </ac:spMkLst>
-        </pc:spChg>
-      </pc:sldChg>
-      <pc:sldChg chg="modSp">
-        <pc:chgData name="JD Kilgallin" userId="e8d7d97525d46f8a" providerId="Windows Live" clId="Web-{0ED70861-6065-4019-8764-BF8B1DB834D2}" dt="2022-09-12T16:52:40.875" v="6" actId="20577"/>
-        <pc:sldMkLst>
-          <pc:docMk/>
-          <pc:sldMk cId="3469622227" sldId="266"/>
-        </pc:sldMkLst>
-        <pc:spChg chg="mod">
-          <ac:chgData name="JD Kilgallin" userId="e8d7d97525d46f8a" providerId="Windows Live" clId="Web-{0ED70861-6065-4019-8764-BF8B1DB834D2}" dt="2022-09-12T16:52:40.875" v="6" actId="20577"/>
-          <ac:spMkLst>
-            <pc:docMk/>
-            <pc:sldMk cId="3469622227" sldId="266"/>
-            <ac:spMk id="3" creationId="{C58B92BC-58FF-7B6B-D84E-EA81EF5944FF}"/>
-          </ac:spMkLst>
-        </pc:spChg>
-      </pc:sldChg>
-      <pc:sldChg chg="modSp">
-        <pc:chgData name="JD Kilgallin" userId="e8d7d97525d46f8a" providerId="Windows Live" clId="Web-{0ED70861-6065-4019-8764-BF8B1DB834D2}" dt="2022-09-12T16:59:00.326" v="33" actId="20577"/>
-        <pc:sldMkLst>
-          <pc:docMk/>
-          <pc:sldMk cId="1326761699" sldId="267"/>
-        </pc:sldMkLst>
-        <pc:spChg chg="mod">
-          <ac:chgData name="JD Kilgallin" userId="e8d7d97525d46f8a" providerId="Windows Live" clId="Web-{0ED70861-6065-4019-8764-BF8B1DB834D2}" dt="2022-09-12T16:59:00.326" v="33" actId="20577"/>
-          <ac:spMkLst>
-            <pc:docMk/>
-            <pc:sldMk cId="1326761699" sldId="267"/>
-            <ac:spMk id="2" creationId="{D7AE5D52-A9D0-EAC7-311E-8E1546EBA171}"/>
-          </ac:spMkLst>
-        </pc:spChg>
-      </pc:sldChg>
-      <pc:sldChg chg="addSp delSp modSp new del">
-        <pc:chgData name="JD Kilgallin" userId="e8d7d97525d46f8a" providerId="Windows Live" clId="Web-{0ED70861-6065-4019-8764-BF8B1DB834D2}" dt="2022-09-12T16:58:13.246" v="18"/>
-        <pc:sldMkLst>
-          <pc:docMk/>
-          <pc:sldMk cId="3382776986" sldId="268"/>
-        </pc:sldMkLst>
-        <pc:spChg chg="add del mod">
-          <ac:chgData name="JD Kilgallin" userId="e8d7d97525d46f8a" providerId="Windows Live" clId="Web-{0ED70861-6065-4019-8764-BF8B1DB834D2}" dt="2022-09-12T16:58:12.262" v="17"/>
-          <ac:spMkLst>
-            <pc:docMk/>
-            <pc:sldMk cId="3382776986" sldId="268"/>
-            <ac:spMk id="4" creationId="{650C9A35-5A73-335F-74AD-4EBF2F3375C8}"/>
-          </ac:spMkLst>
-        </pc:spChg>
-      </pc:sldChg>
-      <pc:sldChg chg="modSp new">
-        <pc:chgData name="JD Kilgallin" userId="e8d7d97525d46f8a" providerId="Windows Live" clId="Web-{0ED70861-6065-4019-8764-BF8B1DB834D2}" dt="2022-09-12T16:59:06.873" v="43" actId="20577"/>
-        <pc:sldMkLst>
-          <pc:docMk/>
-          <pc:sldMk cId="4000411785" sldId="268"/>
-        </pc:sldMkLst>
-        <pc:spChg chg="mod">
-          <ac:chgData name="JD Kilgallin" userId="e8d7d97525d46f8a" providerId="Windows Live" clId="Web-{0ED70861-6065-4019-8764-BF8B1DB834D2}" dt="2022-09-12T16:59:06.873" v="43" actId="20577"/>
-          <ac:spMkLst>
-            <pc:docMk/>
-            <pc:sldMk cId="4000411785" sldId="268"/>
-            <ac:spMk id="2" creationId="{A75F2496-1F3F-8545-92E4-E379D9C808C8}"/>
-          </ac:spMkLst>
-        </pc:spChg>
-        <pc:spChg chg="mod">
-          <ac:chgData name="JD Kilgallin" userId="e8d7d97525d46f8a" providerId="Windows Live" clId="Web-{0ED70861-6065-4019-8764-BF8B1DB834D2}" dt="2022-09-12T16:58:29.356" v="25" actId="20577"/>
-          <ac:spMkLst>
-            <pc:docMk/>
-            <pc:sldMk cId="4000411785" sldId="268"/>
-            <ac:spMk id="3" creationId="{1E0B87CF-629A-2C0C-E448-C97B160A5E43}"/>
-          </ac:spMkLst>
-        </pc:spChg>
-      </pc:sldChg>
-      <pc:sldChg chg="modSp new">
-        <pc:chgData name="JD Kilgallin" userId="e8d7d97525d46f8a" providerId="Windows Live" clId="Web-{0ED70861-6065-4019-8764-BF8B1DB834D2}" dt="2022-09-12T20:43:00.448" v="389" actId="20577"/>
-        <pc:sldMkLst>
-          <pc:docMk/>
-          <pc:sldMk cId="129669319" sldId="269"/>
-        </pc:sldMkLst>
-        <pc:spChg chg="mod">
-          <ac:chgData name="JD Kilgallin" userId="e8d7d97525d46f8a" providerId="Windows Live" clId="Web-{0ED70861-6065-4019-8764-BF8B1DB834D2}" dt="2022-09-12T16:59:16.389" v="49" actId="20577"/>
-          <ac:spMkLst>
-            <pc:docMk/>
-            <pc:sldMk cId="129669319" sldId="269"/>
-            <ac:spMk id="2" creationId="{86D001E3-DDC6-8B55-2092-5266069115DC}"/>
-          </ac:spMkLst>
-        </pc:spChg>
-        <pc:spChg chg="mod">
-          <ac:chgData name="JD Kilgallin" userId="e8d7d97525d46f8a" providerId="Windows Live" clId="Web-{0ED70861-6065-4019-8764-BF8B1DB834D2}" dt="2022-09-12T20:43:00.448" v="389" actId="20577"/>
-          <ac:spMkLst>
-            <pc:docMk/>
-            <pc:sldMk cId="129669319" sldId="269"/>
-            <ac:spMk id="3" creationId="{47C018B5-C8DD-0A57-074D-4C9F1907346C}"/>
-          </ac:spMkLst>
-        </pc:spChg>
-      </pc:sldChg>
-    </pc:docChg>
-  </pc:docChgLst>
-  <pc:docChgLst>
-    <pc:chgData name="JD Kilgallin" userId="e8d7d97525d46f8a" providerId="Windows Live" clId="Web-{A3DAB2D2-DD6E-47D9-9A7E-1C1690C502AC}"/>
-    <pc:docChg chg="addSld modSld">
-      <pc:chgData name="JD Kilgallin" userId="e8d7d97525d46f8a" providerId="Windows Live" clId="Web-{A3DAB2D2-DD6E-47D9-9A7E-1C1690C502AC}" dt="2022-09-06T02:24:29.799" v="290" actId="20577"/>
-      <pc:docMkLst>
-        <pc:docMk/>
-      </pc:docMkLst>
-      <pc:sldChg chg="modSp">
-        <pc:chgData name="JD Kilgallin" userId="e8d7d97525d46f8a" providerId="Windows Live" clId="Web-{A3DAB2D2-DD6E-47D9-9A7E-1C1690C502AC}" dt="2022-09-06T02:23:56.532" v="279" actId="20577"/>
-        <pc:sldMkLst>
-          <pc:docMk/>
-          <pc:sldMk cId="1498873" sldId="259"/>
-        </pc:sldMkLst>
-        <pc:spChg chg="mod">
-          <ac:chgData name="JD Kilgallin" userId="e8d7d97525d46f8a" providerId="Windows Live" clId="Web-{A3DAB2D2-DD6E-47D9-9A7E-1C1690C502AC}" dt="2022-09-06T02:23:56.532" v="279" actId="20577"/>
-          <ac:spMkLst>
-            <pc:docMk/>
-            <pc:sldMk cId="1498873" sldId="259"/>
-            <ac:spMk id="2" creationId="{C26B287A-30D9-3537-02D9-0F5F89A0C5F6}"/>
-          </ac:spMkLst>
-        </pc:spChg>
-        <pc:spChg chg="mod">
-          <ac:chgData name="JD Kilgallin" userId="e8d7d97525d46f8a" providerId="Windows Live" clId="Web-{A3DAB2D2-DD6E-47D9-9A7E-1C1690C502AC}" dt="2022-09-06T02:21:12.279" v="218" actId="20577"/>
-          <ac:spMkLst>
-            <pc:docMk/>
-            <pc:sldMk cId="1498873" sldId="259"/>
-            <ac:spMk id="3" creationId="{A90BBC54-82F0-6DAE-FAE1-13652C1548F0}"/>
-          </ac:spMkLst>
-        </pc:spChg>
-      </pc:sldChg>
-      <pc:sldChg chg="modSp">
-        <pc:chgData name="JD Kilgallin" userId="e8d7d97525d46f8a" providerId="Windows Live" clId="Web-{A3DAB2D2-DD6E-47D9-9A7E-1C1690C502AC}" dt="2022-09-06T02:23:51.157" v="277" actId="20577"/>
-        <pc:sldMkLst>
-          <pc:docMk/>
-          <pc:sldMk cId="1288255770" sldId="260"/>
-        </pc:sldMkLst>
-        <pc:spChg chg="mod">
-          <ac:chgData name="JD Kilgallin" userId="e8d7d97525d46f8a" providerId="Windows Live" clId="Web-{A3DAB2D2-DD6E-47D9-9A7E-1C1690C502AC}" dt="2022-09-06T02:23:51.157" v="277" actId="20577"/>
-          <ac:spMkLst>
-            <pc:docMk/>
-            <pc:sldMk cId="1288255770" sldId="260"/>
-            <ac:spMk id="2" creationId="{E930A632-31A9-B5C7-0CCC-E2A748614A3C}"/>
-          </ac:spMkLst>
-        </pc:spChg>
-        <pc:spChg chg="mod">
-          <ac:chgData name="JD Kilgallin" userId="e8d7d97525d46f8a" providerId="Windows Live" clId="Web-{A3DAB2D2-DD6E-47D9-9A7E-1C1690C502AC}" dt="2022-09-06T02:21:18.091" v="220" actId="20577"/>
-          <ac:spMkLst>
-            <pc:docMk/>
-            <pc:sldMk cId="1288255770" sldId="260"/>
-            <ac:spMk id="3" creationId="{403C48ED-CD47-B814-0889-12E9C21754A5}"/>
-          </ac:spMkLst>
-        </pc:spChg>
-      </pc:sldChg>
-      <pc:sldChg chg="modSp">
-        <pc:chgData name="JD Kilgallin" userId="e8d7d97525d46f8a" providerId="Windows Live" clId="Web-{A3DAB2D2-DD6E-47D9-9A7E-1C1690C502AC}" dt="2022-09-06T02:24:02.720" v="281" actId="20577"/>
-        <pc:sldMkLst>
-          <pc:docMk/>
-          <pc:sldMk cId="49521084" sldId="261"/>
-        </pc:sldMkLst>
-        <pc:spChg chg="mod">
-          <ac:chgData name="JD Kilgallin" userId="e8d7d97525d46f8a" providerId="Windows Live" clId="Web-{A3DAB2D2-DD6E-47D9-9A7E-1C1690C502AC}" dt="2022-09-06T02:24:02.720" v="281" actId="20577"/>
-          <ac:spMkLst>
-            <pc:docMk/>
-            <pc:sldMk cId="49521084" sldId="261"/>
-            <ac:spMk id="2" creationId="{9E44F426-2187-2DEA-1C3E-17BB748D246D}"/>
-          </ac:spMkLst>
-        </pc:spChg>
-        <pc:spChg chg="mod">
-          <ac:chgData name="JD Kilgallin" userId="e8d7d97525d46f8a" providerId="Windows Live" clId="Web-{A3DAB2D2-DD6E-47D9-9A7E-1C1690C502AC}" dt="2022-09-06T02:21:35.092" v="223" actId="20577"/>
-          <ac:spMkLst>
-            <pc:docMk/>
-            <pc:sldMk cId="49521084" sldId="261"/>
-            <ac:spMk id="3" creationId="{79CE41BB-D53A-C434-36D8-C96E4A177096}"/>
-          </ac:spMkLst>
-        </pc:spChg>
-      </pc:sldChg>
-      <pc:sldChg chg="modSp">
-        <pc:chgData name="JD Kilgallin" userId="e8d7d97525d46f8a" providerId="Windows Live" clId="Web-{A3DAB2D2-DD6E-47D9-9A7E-1C1690C502AC}" dt="2022-09-06T02:24:09.564" v="283" actId="20577"/>
-        <pc:sldMkLst>
-          <pc:docMk/>
-          <pc:sldMk cId="2647245224" sldId="262"/>
-        </pc:sldMkLst>
-        <pc:spChg chg="mod">
-          <ac:chgData name="JD Kilgallin" userId="e8d7d97525d46f8a" providerId="Windows Live" clId="Web-{A3DAB2D2-DD6E-47D9-9A7E-1C1690C502AC}" dt="2022-09-06T02:24:09.564" v="283" actId="20577"/>
-          <ac:spMkLst>
-            <pc:docMk/>
-            <pc:sldMk cId="2647245224" sldId="262"/>
-            <ac:spMk id="2" creationId="{FA49E23E-B42B-09C4-23B5-89F912307E7A}"/>
-          </ac:spMkLst>
-        </pc:spChg>
-        <pc:spChg chg="mod">
-          <ac:chgData name="JD Kilgallin" userId="e8d7d97525d46f8a" providerId="Windows Live" clId="Web-{A3DAB2D2-DD6E-47D9-9A7E-1C1690C502AC}" dt="2022-09-06T02:22:00.108" v="232" actId="20577"/>
-          <ac:spMkLst>
-            <pc:docMk/>
-            <pc:sldMk cId="2647245224" sldId="262"/>
-            <ac:spMk id="3" creationId="{0AC3777A-15CC-4B3B-0C92-7F63DFEA7A4F}"/>
-          </ac:spMkLst>
-        </pc:spChg>
-      </pc:sldChg>
-      <pc:sldChg chg="modSp new">
-        <pc:chgData name="JD Kilgallin" userId="e8d7d97525d46f8a" providerId="Windows Live" clId="Web-{A3DAB2D2-DD6E-47D9-9A7E-1C1690C502AC}" dt="2022-09-06T02:19:58.730" v="204" actId="20577"/>
-        <pc:sldMkLst>
-          <pc:docMk/>
-          <pc:sldMk cId="4231193453" sldId="264"/>
-        </pc:sldMkLst>
-        <pc:spChg chg="mod">
-          <ac:chgData name="JD Kilgallin" userId="e8d7d97525d46f8a" providerId="Windows Live" clId="Web-{A3DAB2D2-DD6E-47D9-9A7E-1C1690C502AC}" dt="2022-09-05T18:38:21.167" v="19" actId="20577"/>
-          <ac:spMkLst>
-            <pc:docMk/>
-            <pc:sldMk cId="4231193453" sldId="264"/>
-            <ac:spMk id="2" creationId="{D9AD62D8-793D-8F74-E7F5-9B0550B3639C}"/>
-          </ac:spMkLst>
-        </pc:spChg>
-        <pc:spChg chg="mod">
-          <ac:chgData name="JD Kilgallin" userId="e8d7d97525d46f8a" providerId="Windows Live" clId="Web-{A3DAB2D2-DD6E-47D9-9A7E-1C1690C502AC}" dt="2022-09-06T02:19:58.730" v="204" actId="20577"/>
-          <ac:spMkLst>
-            <pc:docMk/>
-            <pc:sldMk cId="4231193453" sldId="264"/>
-            <ac:spMk id="3" creationId="{B56FAD34-AFC3-F877-254C-AEC26C70652F}"/>
-          </ac:spMkLst>
-        </pc:spChg>
-      </pc:sldChg>
-      <pc:sldChg chg="modSp new">
-        <pc:chgData name="JD Kilgallin" userId="e8d7d97525d46f8a" providerId="Windows Live" clId="Web-{A3DAB2D2-DD6E-47D9-9A7E-1C1690C502AC}" dt="2022-09-06T02:24:15.830" v="285" actId="20577"/>
-        <pc:sldMkLst>
-          <pc:docMk/>
-          <pc:sldMk cId="4209816612" sldId="265"/>
-        </pc:sldMkLst>
-        <pc:spChg chg="mod">
-          <ac:chgData name="JD Kilgallin" userId="e8d7d97525d46f8a" providerId="Windows Live" clId="Web-{A3DAB2D2-DD6E-47D9-9A7E-1C1690C502AC}" dt="2022-09-06T02:24:15.830" v="285" actId="20577"/>
-          <ac:spMkLst>
-            <pc:docMk/>
-            <pc:sldMk cId="4209816612" sldId="265"/>
-            <ac:spMk id="2" creationId="{89B196A4-D168-ECE9-B133-983009A39B8A}"/>
-          </ac:spMkLst>
-        </pc:spChg>
-        <pc:spChg chg="mod">
-          <ac:chgData name="JD Kilgallin" userId="e8d7d97525d46f8a" providerId="Windows Live" clId="Web-{A3DAB2D2-DD6E-47D9-9A7E-1C1690C502AC}" dt="2022-09-06T02:22:22.968" v="239" actId="20577"/>
-          <ac:spMkLst>
-            <pc:docMk/>
-            <pc:sldMk cId="4209816612" sldId="265"/>
-            <ac:spMk id="3" creationId="{2006FFA9-B49F-B961-878D-DF85FF0193BE}"/>
-          </ac:spMkLst>
-        </pc:spChg>
-      </pc:sldChg>
-      <pc:sldChg chg="modSp new">
-        <pc:chgData name="JD Kilgallin" userId="e8d7d97525d46f8a" providerId="Windows Live" clId="Web-{A3DAB2D2-DD6E-47D9-9A7E-1C1690C502AC}" dt="2022-09-06T02:24:22.736" v="287" actId="20577"/>
-        <pc:sldMkLst>
-          <pc:docMk/>
-          <pc:sldMk cId="3469622227" sldId="266"/>
-        </pc:sldMkLst>
-        <pc:spChg chg="mod">
-          <ac:chgData name="JD Kilgallin" userId="e8d7d97525d46f8a" providerId="Windows Live" clId="Web-{A3DAB2D2-DD6E-47D9-9A7E-1C1690C502AC}" dt="2022-09-06T02:24:22.736" v="287" actId="20577"/>
-          <ac:spMkLst>
-            <pc:docMk/>
-            <pc:sldMk cId="3469622227" sldId="266"/>
-            <ac:spMk id="2" creationId="{D3FD043C-2D0C-4E7B-1FA4-6AC7CD0EC913}"/>
-          </ac:spMkLst>
-        </pc:spChg>
-        <pc:spChg chg="mod">
-          <ac:chgData name="JD Kilgallin" userId="e8d7d97525d46f8a" providerId="Windows Live" clId="Web-{A3DAB2D2-DD6E-47D9-9A7E-1C1690C502AC}" dt="2022-09-06T02:22:49.453" v="253" actId="14100"/>
-          <ac:spMkLst>
-            <pc:docMk/>
-            <pc:sldMk cId="3469622227" sldId="266"/>
-            <ac:spMk id="3" creationId="{C58B92BC-58FF-7B6B-D84E-EA81EF5944FF}"/>
-          </ac:spMkLst>
-        </pc:spChg>
-      </pc:sldChg>
-      <pc:sldChg chg="modSp new">
-        <pc:chgData name="JD Kilgallin" userId="e8d7d97525d46f8a" providerId="Windows Live" clId="Web-{A3DAB2D2-DD6E-47D9-9A7E-1C1690C502AC}" dt="2022-09-06T02:24:29.799" v="290" actId="20577"/>
-        <pc:sldMkLst>
-          <pc:docMk/>
-          <pc:sldMk cId="1326761699" sldId="267"/>
-        </pc:sldMkLst>
-        <pc:spChg chg="mod">
-          <ac:chgData name="JD Kilgallin" userId="e8d7d97525d46f8a" providerId="Windows Live" clId="Web-{A3DAB2D2-DD6E-47D9-9A7E-1C1690C502AC}" dt="2022-09-06T02:24:29.799" v="290" actId="20577"/>
-          <ac:spMkLst>
-            <pc:docMk/>
-            <pc:sldMk cId="1326761699" sldId="267"/>
-            <ac:spMk id="2" creationId="{D7AE5D52-A9D0-EAC7-311E-8E1546EBA171}"/>
-          </ac:spMkLst>
-        </pc:spChg>
-        <pc:spChg chg="mod">
-          <ac:chgData name="JD Kilgallin" userId="e8d7d97525d46f8a" providerId="Windows Live" clId="Web-{A3DAB2D2-DD6E-47D9-9A7E-1C1690C502AC}" dt="2022-09-06T02:23:10.876" v="260" actId="14100"/>
-          <ac:spMkLst>
-            <pc:docMk/>
-            <pc:sldMk cId="1326761699" sldId="267"/>
-            <ac:spMk id="3" creationId="{4C40C725-AFF8-D4FE-212C-FDF93AD64047}"/>
-          </ac:spMkLst>
-        </pc:spChg>
-      </pc:sldChg>
-    </pc:docChg>
-  </pc:docChgLst>
-  <pc:docChgLst>
-    <pc:chgData name="JD Kilgallin" userId="e8d7d97525d46f8a" providerId="Windows Live" clId="Web-{7BBBE70B-8746-4618-B48C-E12E6A670205}"/>
-    <pc:docChg chg="addSld delSld modSld">
-      <pc:chgData name="JD Kilgallin" userId="e8d7d97525d46f8a" providerId="Windows Live" clId="Web-{7BBBE70B-8746-4618-B48C-E12E6A670205}" dt="2022-08-10T13:00:20.246" v="1688" actId="20577"/>
-      <pc:docMkLst>
-        <pc:docMk/>
-      </pc:docMkLst>
-      <pc:sldChg chg="modSp">
-        <pc:chgData name="JD Kilgallin" userId="e8d7d97525d46f8a" providerId="Windows Live" clId="Web-{7BBBE70B-8746-4618-B48C-E12E6A670205}" dt="2022-08-06T02:16:03.157" v="8" actId="14100"/>
-        <pc:sldMkLst>
-          <pc:docMk/>
-          <pc:sldMk cId="109857222" sldId="256"/>
-        </pc:sldMkLst>
-        <pc:spChg chg="mod">
-          <ac:chgData name="JD Kilgallin" userId="e8d7d97525d46f8a" providerId="Windows Live" clId="Web-{7BBBE70B-8746-4618-B48C-E12E6A670205}" dt="2022-08-06T01:58:48.971" v="0" actId="20577"/>
-          <ac:spMkLst>
-            <pc:docMk/>
-            <pc:sldMk cId="109857222" sldId="256"/>
-            <ac:spMk id="2" creationId="{00000000-0000-0000-0000-000000000000}"/>
-          </ac:spMkLst>
-        </pc:spChg>
-        <pc:spChg chg="mod">
-          <ac:chgData name="JD Kilgallin" userId="e8d7d97525d46f8a" providerId="Windows Live" clId="Web-{7BBBE70B-8746-4618-B48C-E12E6A670205}" dt="2022-08-06T02:16:03.157" v="8" actId="14100"/>
-          <ac:spMkLst>
-            <pc:docMk/>
-            <pc:sldMk cId="109857222" sldId="256"/>
-            <ac:spMk id="3" creationId="{00000000-0000-0000-0000-000000000000}"/>
-          </ac:spMkLst>
-        </pc:spChg>
-      </pc:sldChg>
-      <pc:sldChg chg="modSp">
-        <pc:chgData name="JD Kilgallin" userId="e8d7d97525d46f8a" providerId="Windows Live" clId="Web-{7BBBE70B-8746-4618-B48C-E12E6A670205}" dt="2022-08-10T02:52:06.673" v="856" actId="20577"/>
-        <pc:sldMkLst>
-          <pc:docMk/>
-          <pc:sldMk cId="487134755" sldId="257"/>
-        </pc:sldMkLst>
-        <pc:spChg chg="mod">
-          <ac:chgData name="JD Kilgallin" userId="e8d7d97525d46f8a" providerId="Windows Live" clId="Web-{7BBBE70B-8746-4618-B48C-E12E6A670205}" dt="2022-08-10T02:52:06.673" v="856" actId="20577"/>
-          <ac:spMkLst>
-            <pc:docMk/>
-            <pc:sldMk cId="487134755" sldId="257"/>
-            <ac:spMk id="3" creationId="{3E04FA28-0E79-237F-7F30-D982F4258E26}"/>
-          </ac:spMkLst>
-        </pc:spChg>
-      </pc:sldChg>
-      <pc:sldChg chg="modSp del">
-        <pc:chgData name="JD Kilgallin" userId="e8d7d97525d46f8a" providerId="Windows Live" clId="Web-{7BBBE70B-8746-4618-B48C-E12E6A670205}" dt="2022-08-10T02:21:08.368" v="221"/>
-        <pc:sldMkLst>
-          <pc:docMk/>
-          <pc:sldMk cId="701072146" sldId="258"/>
-        </pc:sldMkLst>
-        <pc:spChg chg="mod">
-          <ac:chgData name="JD Kilgallin" userId="e8d7d97525d46f8a" providerId="Windows Live" clId="Web-{7BBBE70B-8746-4618-B48C-E12E6A670205}" dt="2022-08-10T02:21:01.571" v="218" actId="20577"/>
-          <ac:spMkLst>
-            <pc:docMk/>
-            <pc:sldMk cId="701072146" sldId="258"/>
-            <ac:spMk id="2" creationId="{88FBF75C-059A-0CF8-E7CF-558877AC8294}"/>
-          </ac:spMkLst>
-        </pc:spChg>
-        <pc:spChg chg="mod">
-          <ac:chgData name="JD Kilgallin" userId="e8d7d97525d46f8a" providerId="Windows Live" clId="Web-{7BBBE70B-8746-4618-B48C-E12E6A670205}" dt="2022-08-10T02:20:48.508" v="213" actId="20577"/>
-          <ac:spMkLst>
-            <pc:docMk/>
-            <pc:sldMk cId="701072146" sldId="258"/>
-            <ac:spMk id="3" creationId="{593E9FB2-C378-51A0-B4CF-C116ED82815E}"/>
-          </ac:spMkLst>
-        </pc:spChg>
-      </pc:sldChg>
-      <pc:sldChg chg="modSp new">
-        <pc:chgData name="JD Kilgallin" userId="e8d7d97525d46f8a" providerId="Windows Live" clId="Web-{7BBBE70B-8746-4618-B48C-E12E6A670205}" dt="2022-08-10T03:09:31.555" v="1274" actId="20577"/>
-        <pc:sldMkLst>
-          <pc:docMk/>
-          <pc:sldMk cId="1498873" sldId="259"/>
-        </pc:sldMkLst>
-        <pc:spChg chg="mod">
-          <ac:chgData name="JD Kilgallin" userId="e8d7d97525d46f8a" providerId="Windows Live" clId="Web-{7BBBE70B-8746-4618-B48C-E12E6A670205}" dt="2022-08-10T03:06:20.132" v="1094" actId="20577"/>
-          <ac:spMkLst>
-            <pc:docMk/>
-            <pc:sldMk cId="1498873" sldId="259"/>
-            <ac:spMk id="2" creationId="{C26B287A-30D9-3537-02D9-0F5F89A0C5F6}"/>
-          </ac:spMkLst>
-        </pc:spChg>
-        <pc:spChg chg="mod">
-          <ac:chgData name="JD Kilgallin" userId="e8d7d97525d46f8a" providerId="Windows Live" clId="Web-{7BBBE70B-8746-4618-B48C-E12E6A670205}" dt="2022-08-10T03:09:31.555" v="1274" actId="20577"/>
-          <ac:spMkLst>
-            <pc:docMk/>
-            <pc:sldMk cId="1498873" sldId="259"/>
-            <ac:spMk id="3" creationId="{A90BBC54-82F0-6DAE-FAE1-13652C1548F0}"/>
-          </ac:spMkLst>
-        </pc:spChg>
-      </pc:sldChg>
-      <pc:sldChg chg="modSp new">
-        <pc:chgData name="JD Kilgallin" userId="e8d7d97525d46f8a" providerId="Windows Live" clId="Web-{7BBBE70B-8746-4618-B48C-E12E6A670205}" dt="2022-08-10T12:56:03.779" v="1570" actId="20577"/>
-        <pc:sldMkLst>
-          <pc:docMk/>
-          <pc:sldMk cId="1288255770" sldId="260"/>
-        </pc:sldMkLst>
-        <pc:spChg chg="mod">
-          <ac:chgData name="JD Kilgallin" userId="e8d7d97525d46f8a" providerId="Windows Live" clId="Web-{7BBBE70B-8746-4618-B48C-E12E6A670205}" dt="2022-08-10T03:06:05.710" v="1089" actId="20577"/>
-          <ac:spMkLst>
-            <pc:docMk/>
-            <pc:sldMk cId="1288255770" sldId="260"/>
-            <ac:spMk id="2" creationId="{E930A632-31A9-B5C7-0CCC-E2A748614A3C}"/>
-          </ac:spMkLst>
-        </pc:spChg>
-        <pc:spChg chg="mod">
-          <ac:chgData name="JD Kilgallin" userId="e8d7d97525d46f8a" providerId="Windows Live" clId="Web-{7BBBE70B-8746-4618-B48C-E12E6A670205}" dt="2022-08-10T12:56:03.779" v="1570" actId="20577"/>
-          <ac:spMkLst>
-            <pc:docMk/>
-            <pc:sldMk cId="1288255770" sldId="260"/>
-            <ac:spMk id="3" creationId="{403C48ED-CD47-B814-0889-12E9C21754A5}"/>
-          </ac:spMkLst>
-        </pc:spChg>
-      </pc:sldChg>
-      <pc:sldChg chg="modSp new">
-        <pc:chgData name="JD Kilgallin" userId="e8d7d97525d46f8a" providerId="Windows Live" clId="Web-{7BBBE70B-8746-4618-B48C-E12E6A670205}" dt="2022-08-10T12:57:16.216" v="1626" actId="20577"/>
-        <pc:sldMkLst>
-          <pc:docMk/>
-          <pc:sldMk cId="49521084" sldId="261"/>
-        </pc:sldMkLst>
-        <pc:spChg chg="mod">
-          <ac:chgData name="JD Kilgallin" userId="e8d7d97525d46f8a" providerId="Windows Live" clId="Web-{7BBBE70B-8746-4618-B48C-E12E6A670205}" dt="2022-08-10T03:09:38.852" v="1280" actId="20577"/>
-          <ac:spMkLst>
-            <pc:docMk/>
-            <pc:sldMk cId="49521084" sldId="261"/>
-            <ac:spMk id="2" creationId="{9E44F426-2187-2DEA-1C3E-17BB748D246D}"/>
-          </ac:spMkLst>
-        </pc:spChg>
-        <pc:spChg chg="mod">
-          <ac:chgData name="JD Kilgallin" userId="e8d7d97525d46f8a" providerId="Windows Live" clId="Web-{7BBBE70B-8746-4618-B48C-E12E6A670205}" dt="2022-08-10T12:57:16.216" v="1626" actId="20577"/>
-          <ac:spMkLst>
-            <pc:docMk/>
-            <pc:sldMk cId="49521084" sldId="261"/>
-            <ac:spMk id="3" creationId="{79CE41BB-D53A-C434-36D8-C96E4A177096}"/>
-          </ac:spMkLst>
-        </pc:spChg>
-      </pc:sldChg>
-      <pc:sldChg chg="modSp new">
-        <pc:chgData name="JD Kilgallin" userId="e8d7d97525d46f8a" providerId="Windows Live" clId="Web-{7BBBE70B-8746-4618-B48C-E12E6A670205}" dt="2022-08-10T12:58:32.262" v="1631" actId="20577"/>
-        <pc:sldMkLst>
-          <pc:docMk/>
-          <pc:sldMk cId="2647245224" sldId="262"/>
-        </pc:sldMkLst>
-        <pc:spChg chg="mod">
-          <ac:chgData name="JD Kilgallin" userId="e8d7d97525d46f8a" providerId="Windows Live" clId="Web-{7BBBE70B-8746-4618-B48C-E12E6A670205}" dt="2022-08-10T12:58:32.262" v="1631" actId="20577"/>
-          <ac:spMkLst>
-            <pc:docMk/>
-            <pc:sldMk cId="2647245224" sldId="262"/>
-            <ac:spMk id="2" creationId="{FA49E23E-B42B-09C4-23B5-89F912307E7A}"/>
-          </ac:spMkLst>
-        </pc:spChg>
-        <pc:spChg chg="mod">
-          <ac:chgData name="JD Kilgallin" userId="e8d7d97525d46f8a" providerId="Windows Live" clId="Web-{7BBBE70B-8746-4618-B48C-E12E6A670205}" dt="2022-08-10T12:57:02.560" v="1624" actId="20577"/>
-          <ac:spMkLst>
-            <pc:docMk/>
-            <pc:sldMk cId="2647245224" sldId="262"/>
-            <ac:spMk id="3" creationId="{0AC3777A-15CC-4B3B-0C92-7F63DFEA7A4F}"/>
-          </ac:spMkLst>
-        </pc:spChg>
-      </pc:sldChg>
-      <pc:sldChg chg="modSp new">
-        <pc:chgData name="JD Kilgallin" userId="e8d7d97525d46f8a" providerId="Windows Live" clId="Web-{7BBBE70B-8746-4618-B48C-E12E6A670205}" dt="2022-08-10T13:00:20.246" v="1688" actId="20577"/>
-        <pc:sldMkLst>
-          <pc:docMk/>
-          <pc:sldMk cId="1928605281" sldId="263"/>
-        </pc:sldMkLst>
-        <pc:spChg chg="mod">
-          <ac:chgData name="JD Kilgallin" userId="e8d7d97525d46f8a" providerId="Windows Live" clId="Web-{7BBBE70B-8746-4618-B48C-E12E6A670205}" dt="2022-08-10T12:58:45.778" v="1636" actId="20577"/>
-          <ac:spMkLst>
-            <pc:docMk/>
-            <pc:sldMk cId="1928605281" sldId="263"/>
-            <ac:spMk id="2" creationId="{546B1506-68D0-7C74-E245-96D76ABFEED2}"/>
-          </ac:spMkLst>
-        </pc:spChg>
-        <pc:spChg chg="mod">
-          <ac:chgData name="JD Kilgallin" userId="e8d7d97525d46f8a" providerId="Windows Live" clId="Web-{7BBBE70B-8746-4618-B48C-E12E6A670205}" dt="2022-08-10T13:00:20.246" v="1688" actId="20577"/>
-          <ac:spMkLst>
-            <pc:docMk/>
-            <pc:sldMk cId="1928605281" sldId="263"/>
-            <ac:spMk id="3" creationId="{6BB8F018-0625-81F3-2679-E28BF1ECCA4B}"/>
-          </ac:spMkLst>
-        </pc:spChg>
-      </pc:sldChg>
-    </pc:docChg>
-  </pc:docChgLst>
-  <pc:docChgLst>
-    <pc:chgData name="JD Kilgallin" userId="e8d7d97525d46f8a" providerId="Windows Live" clId="Web-{87C8BD35-9779-4BE6-8ED7-EB230113F9D5}"/>
-    <pc:docChg chg="addSld modSld">
-      <pc:chgData name="JD Kilgallin" userId="e8d7d97525d46f8a" providerId="Windows Live" clId="Web-{87C8BD35-9779-4BE6-8ED7-EB230113F9D5}" dt="2022-06-30T18:52:08.389" v="109" actId="20577"/>
-      <pc:docMkLst>
-        <pc:docMk/>
-      </pc:docMkLst>
-      <pc:sldChg chg="modSp new">
-        <pc:chgData name="JD Kilgallin" userId="e8d7d97525d46f8a" providerId="Windows Live" clId="Web-{87C8BD35-9779-4BE6-8ED7-EB230113F9D5}" dt="2022-06-30T18:52:08.389" v="109" actId="20577"/>
-        <pc:sldMkLst>
-          <pc:docMk/>
-          <pc:sldMk cId="701072146" sldId="258"/>
-        </pc:sldMkLst>
-        <pc:spChg chg="mod">
-          <ac:chgData name="JD Kilgallin" userId="e8d7d97525d46f8a" providerId="Windows Live" clId="Web-{87C8BD35-9779-4BE6-8ED7-EB230113F9D5}" dt="2022-06-30T18:47:11.906" v="5" actId="20577"/>
-          <ac:spMkLst>
-            <pc:docMk/>
-            <pc:sldMk cId="701072146" sldId="258"/>
-            <ac:spMk id="2" creationId="{88FBF75C-059A-0CF8-E7CF-558877AC8294}"/>
-          </ac:spMkLst>
-        </pc:spChg>
-        <pc:spChg chg="mod">
-          <ac:chgData name="JD Kilgallin" userId="e8d7d97525d46f8a" providerId="Windows Live" clId="Web-{87C8BD35-9779-4BE6-8ED7-EB230113F9D5}" dt="2022-06-30T18:52:08.389" v="109" actId="20577"/>
-          <ac:spMkLst>
-            <pc:docMk/>
-            <pc:sldMk cId="701072146" sldId="258"/>
-            <ac:spMk id="3" creationId="{593E9FB2-C378-51A0-B4CF-C116ED82815E}"/>
-          </ac:spMkLst>
-        </pc:spChg>
-      </pc:sldChg>
-    </pc:docChg>
-  </pc:docChgLst>
-</pc:chgInfo>
 </file>
 
 <file path=ppt/slideLayouts/slideLayout1.xml><?xml version="1.0" encoding="utf-8"?>
@@ -4505,7 +3906,12 @@
             <p:ph idx="1"/>
           </p:nvPr>
         </p:nvSpPr>
-        <p:spPr/>
+        <p:spPr>
+          <a:xfrm>
+            <a:off x="838200" y="1825625"/>
+            <a:ext cx="10515600" cy="4781184"/>
+          </a:xfrm>
+        </p:spPr>
         <p:txBody>
           <a:bodyPr vert="horz" lIns="91440" tIns="45720" rIns="91440" bIns="45720" rtlCol="0" anchor="t">
             <a:normAutofit/>
@@ -4513,97 +3919,60 @@
           <a:lstStyle/>
           <a:p>
             <a:r>
-              <a:rPr lang="en-US">
+              <a:rPr lang="en-US" dirty="0">
                 <a:ea typeface="Calibri"/>
                 <a:cs typeface="Calibri"/>
               </a:rPr>
-              <a:t>Quiz Wednesday a</a:t>
+              <a:t>Quiz Wednesday on lectures 4 and 5, excluding example interview question on summing two numbers in an array.</a:t>
+            </a:r>
+          </a:p>
+          <a:p>
+            <a:r>
+              <a:rPr lang="en-US" dirty="0">
+                <a:ea typeface="Calibri"/>
+                <a:cs typeface="Calibri"/>
+              </a:rPr>
+              <a:t>Quizzes are not weighted; grades are averaged regardless of points used in each. E.g. 1/1, 4/8, &amp; 0/10 give 75% after dropping lowest.</a:t>
+            </a:r>
+          </a:p>
+          <a:p>
+            <a:r>
+              <a:rPr lang="en-US" dirty="0">
+                <a:ea typeface="Calibri"/>
+                <a:cs typeface="Calibri"/>
+              </a:rPr>
+              <a:t>See blackboard announcement on some sample projects in my GitHub account that you could start from for a portfolio project.</a:t>
+            </a:r>
+          </a:p>
+          <a:p>
+            <a:r>
+              <a:rPr lang="en-US" dirty="0">
+                <a:ea typeface="Calibri"/>
+                <a:cs typeface="Calibri"/>
+              </a:rPr>
+              <a:t>It is acceptable to have work-in-progress projects in your portfolio.</a:t>
+            </a:r>
+          </a:p>
+          <a:p>
+            <a:r>
+              <a:rPr lang="en-US" dirty="0">
+                <a:ea typeface="Calibri"/>
+                <a:cs typeface="Calibri"/>
+              </a:rPr>
+              <a:t>Email me if you're not sure if something belongs on GitHub.</a:t>
+            </a:r>
+          </a:p>
+          <a:p>
+            <a:r>
+              <a:rPr lang="en-US" dirty="0">
+                <a:ea typeface="Calibri"/>
+                <a:cs typeface="Calibri"/>
+              </a:rPr>
+              <a:t>Still missing 5 GitHub usernames. Will send emails if they're not in tonight.</a:t>
             </a:r>
             <a:endParaRPr lang="en-US" dirty="0">
-              <a:ea typeface="Calibri"/>
               <a:cs typeface="Calibri"/>
             </a:endParaRPr>
-          </a:p>
-          <a:p>
-            <a:r>
-              <a:rPr lang="en-US">
-                <a:ea typeface="Calibri"/>
-                <a:cs typeface="Calibri"/>
-              </a:rPr>
-              <a:t>Quizzes </a:t>
-            </a:r>
-            <a:r>
-              <a:rPr lang="en-US" dirty="0">
-                <a:ea typeface="Calibri"/>
-                <a:cs typeface="Calibri"/>
-              </a:rPr>
-              <a:t>are not weighted; grades are averaged regardless of points used in each. E.g. 1/1, 4/8, &amp; 0/10 give 75% after dropping lowest.</a:t>
-            </a:r>
-          </a:p>
-          <a:p>
-            <a:r>
-              <a:rPr lang="en-US">
-                <a:ea typeface="Calibri"/>
-                <a:cs typeface="Calibri"/>
-              </a:rPr>
-              <a:t>See blackboard announcement on some sample projects in my </a:t>
-            </a:r>
-            <a:r>
-              <a:rPr lang="en-US" dirty="0">
-                <a:ea typeface="Calibri"/>
-                <a:cs typeface="Calibri"/>
-              </a:rPr>
-              <a:t>GitHub account that you could start from for a portfolio project.</a:t>
-            </a:r>
-          </a:p>
-          <a:p>
-            <a:r>
-              <a:rPr lang="en-US" dirty="0">
-                <a:ea typeface="Calibri"/>
-                <a:cs typeface="Calibri"/>
-              </a:rPr>
-              <a:t>It is acceptable to have work-in-progress projects in your </a:t>
-            </a:r>
-            <a:r>
-              <a:rPr lang="en-US">
-                <a:ea typeface="Calibri"/>
-                <a:cs typeface="Calibri"/>
-              </a:rPr>
-              <a:t>portfolio.</a:t>
-            </a:r>
-          </a:p>
-          <a:p>
-            <a:r>
-              <a:rPr lang="en-US" dirty="0">
-                <a:ea typeface="Calibri"/>
-                <a:cs typeface="Calibri"/>
-              </a:rPr>
-              <a:t>Email me if you're not sure if something belongs on </a:t>
-            </a:r>
-            <a:r>
-              <a:rPr lang="en-US">
-                <a:ea typeface="Calibri"/>
-                <a:cs typeface="Calibri"/>
-              </a:rPr>
-              <a:t>GitHub.</a:t>
-            </a:r>
-          </a:p>
-          <a:p>
-            <a:r>
-              <a:rPr lang="en-US">
-                <a:ea typeface="Calibri"/>
-                <a:cs typeface="Calibri"/>
-              </a:rPr>
-              <a:t>Still </a:t>
-            </a:r>
-            <a:r>
-              <a:rPr lang="en-US" dirty="0">
-                <a:ea typeface="Calibri"/>
-                <a:cs typeface="Calibri"/>
-              </a:rPr>
-              <a:t>missing 5 GitHub usernames. If you got an email about it, get that to me tonight.</a:t>
-            </a:r>
-            <a:endParaRPr lang="en-US"/>
           </a:p>
         </p:txBody>
       </p:sp>

</xml_diff>